<commit_message>
Lab #5 2/21, 2/24 - selection/bubble sort
</commit_message>
<xml_diff>
--- a/cs401_lab_2_21_20.pptx
+++ b/cs401_lab_2_21_20.pptx
@@ -5,7 +5,7 @@
     <p:sldMasterId id="2147483660" r:id="rId1"/>
   </p:sldMasterIdLst>
   <p:notesMasterIdLst>
-    <p:notesMasterId r:id="rId11"/>
+    <p:notesMasterId r:id="rId12"/>
   </p:notesMasterIdLst>
   <p:sldIdLst>
     <p:sldId id="256" r:id="rId2"/>
@@ -15,8 +15,9 @@
     <p:sldId id="272" r:id="rId6"/>
     <p:sldId id="273" r:id="rId7"/>
     <p:sldId id="274" r:id="rId8"/>
-    <p:sldId id="275" r:id="rId9"/>
-    <p:sldId id="276" r:id="rId10"/>
+    <p:sldId id="277" r:id="rId9"/>
+    <p:sldId id="275" r:id="rId10"/>
+    <p:sldId id="276" r:id="rId11"/>
   </p:sldIdLst>
   <p:sldSz cx="9144000" cy="6858000" type="screen4x3"/>
   <p:notesSz cx="6858000" cy="9144000"/>
@@ -216,7 +217,7 @@
           <a:p>
             <a:fld id="{95A4384D-C0A9-48C5-B94B-43CB0E0C0E08}" type="datetimeFigureOut">
               <a:rPr lang="en-US" smtClean="0"/>
-              <a:t>2/20/2020</a:t>
+              <a:t>2/21/2020</a:t>
             </a:fld>
             <a:endParaRPr lang="en-US"/>
           </a:p>
@@ -567,6 +568,90 @@
 </p:notes>
 </file>
 
+<file path=ppt/notesSlides/notesSlide2.xml><?xml version="1.0" encoding="utf-8"?>
+<p:notes xmlns:a="http://schemas.openxmlformats.org/drawingml/2006/main" xmlns:r="http://schemas.openxmlformats.org/officeDocument/2006/relationships" xmlns:p="http://schemas.openxmlformats.org/presentationml/2006/main">
+  <p:cSld>
+    <p:spTree>
+      <p:nvGrpSpPr>
+        <p:cNvPr id="1" name=""/>
+        <p:cNvGrpSpPr/>
+        <p:nvPr/>
+      </p:nvGrpSpPr>
+      <p:grpSpPr>
+        <a:xfrm>
+          <a:off x="0" y="0"/>
+          <a:ext cx="0" cy="0"/>
+          <a:chOff x="0" y="0"/>
+          <a:chExt cx="0" cy="0"/>
+        </a:xfrm>
+      </p:grpSpPr>
+      <p:sp>
+        <p:nvSpPr>
+          <p:cNvPr id="2" name="Slide Image Placeholder 1"/>
+          <p:cNvSpPr>
+            <a:spLocks noGrp="1" noRot="1" noChangeAspect="1"/>
+          </p:cNvSpPr>
+          <p:nvPr>
+            <p:ph type="sldImg"/>
+          </p:nvPr>
+        </p:nvSpPr>
+        <p:spPr/>
+      </p:sp>
+      <p:sp>
+        <p:nvSpPr>
+          <p:cNvPr id="3" name="Notes Placeholder 2"/>
+          <p:cNvSpPr>
+            <a:spLocks noGrp="1"/>
+          </p:cNvSpPr>
+          <p:nvPr>
+            <p:ph type="body" idx="1"/>
+          </p:nvPr>
+        </p:nvSpPr>
+        <p:spPr/>
+        <p:txBody>
+          <a:bodyPr/>
+          <a:lstStyle/>
+          <a:p>
+            <a:endParaRPr lang="en-US" dirty="0"/>
+          </a:p>
+        </p:txBody>
+      </p:sp>
+      <p:sp>
+        <p:nvSpPr>
+          <p:cNvPr id="4" name="Slide Number Placeholder 3"/>
+          <p:cNvSpPr>
+            <a:spLocks noGrp="1"/>
+          </p:cNvSpPr>
+          <p:nvPr>
+            <p:ph type="sldNum" sz="quarter" idx="5"/>
+          </p:nvPr>
+        </p:nvSpPr>
+        <p:spPr/>
+        <p:txBody>
+          <a:bodyPr/>
+          <a:lstStyle/>
+          <a:p>
+            <a:fld id="{0C8BE0AE-15F9-4BDB-9553-2A7F13FD6B2E}" type="slidenum">
+              <a:rPr lang="en-US" smtClean="0"/>
+              <a:t>8</a:t>
+            </a:fld>
+            <a:endParaRPr lang="en-US"/>
+          </a:p>
+        </p:txBody>
+      </p:sp>
+    </p:spTree>
+    <p:extLst>
+      <p:ext uri="{BB962C8B-B14F-4D97-AF65-F5344CB8AC3E}">
+        <p14:creationId xmlns:p14="http://schemas.microsoft.com/office/powerpoint/2010/main" val="1428641294"/>
+      </p:ext>
+    </p:extLst>
+  </p:cSld>
+  <p:clrMapOvr>
+    <a:masterClrMapping/>
+  </p:clrMapOvr>
+</p:notes>
+</file>
+
 <file path=ppt/slideLayouts/slideLayout1.xml><?xml version="1.0" encoding="utf-8"?>
 <p:sldLayout xmlns:a="http://schemas.openxmlformats.org/drawingml/2006/main" xmlns:r="http://schemas.openxmlformats.org/officeDocument/2006/relationships" xmlns:p="http://schemas.openxmlformats.org/presentationml/2006/main" type="title" preserve="1">
   <p:cSld name="Title Slide">
@@ -698,7 +783,7 @@
           <a:p>
             <a:fld id="{331D76CF-5E7C-420B-89A3-7189BACB8345}" type="datetimeFigureOut">
               <a:rPr lang="en-US" smtClean="0"/>
-              <a:t>2/20/2020</a:t>
+              <a:t>2/21/2020</a:t>
             </a:fld>
             <a:endParaRPr lang="en-US"/>
           </a:p>
@@ -868,7 +953,7 @@
           <a:p>
             <a:fld id="{331D76CF-5E7C-420B-89A3-7189BACB8345}" type="datetimeFigureOut">
               <a:rPr lang="en-US" smtClean="0"/>
-              <a:t>2/20/2020</a:t>
+              <a:t>2/21/2020</a:t>
             </a:fld>
             <a:endParaRPr lang="en-US"/>
           </a:p>
@@ -1048,7 +1133,7 @@
           <a:p>
             <a:fld id="{331D76CF-5E7C-420B-89A3-7189BACB8345}" type="datetimeFigureOut">
               <a:rPr lang="en-US" smtClean="0"/>
-              <a:t>2/20/2020</a:t>
+              <a:t>2/21/2020</a:t>
             </a:fld>
             <a:endParaRPr lang="en-US"/>
           </a:p>
@@ -1218,7 +1303,7 @@
           <a:p>
             <a:fld id="{331D76CF-5E7C-420B-89A3-7189BACB8345}" type="datetimeFigureOut">
               <a:rPr lang="en-US" smtClean="0"/>
-              <a:t>2/20/2020</a:t>
+              <a:t>2/21/2020</a:t>
             </a:fld>
             <a:endParaRPr lang="en-US"/>
           </a:p>
@@ -1462,7 +1547,7 @@
           <a:p>
             <a:fld id="{331D76CF-5E7C-420B-89A3-7189BACB8345}" type="datetimeFigureOut">
               <a:rPr lang="en-US" smtClean="0"/>
-              <a:t>2/20/2020</a:t>
+              <a:t>2/21/2020</a:t>
             </a:fld>
             <a:endParaRPr lang="en-US"/>
           </a:p>
@@ -1694,7 +1779,7 @@
           <a:p>
             <a:fld id="{331D76CF-5E7C-420B-89A3-7189BACB8345}" type="datetimeFigureOut">
               <a:rPr lang="en-US" smtClean="0"/>
-              <a:t>2/20/2020</a:t>
+              <a:t>2/21/2020</a:t>
             </a:fld>
             <a:endParaRPr lang="en-US"/>
           </a:p>
@@ -2061,7 +2146,7 @@
           <a:p>
             <a:fld id="{331D76CF-5E7C-420B-89A3-7189BACB8345}" type="datetimeFigureOut">
               <a:rPr lang="en-US" smtClean="0"/>
-              <a:t>2/20/2020</a:t>
+              <a:t>2/21/2020</a:t>
             </a:fld>
             <a:endParaRPr lang="en-US"/>
           </a:p>
@@ -2179,7 +2264,7 @@
           <a:p>
             <a:fld id="{331D76CF-5E7C-420B-89A3-7189BACB8345}" type="datetimeFigureOut">
               <a:rPr lang="en-US" smtClean="0"/>
-              <a:t>2/20/2020</a:t>
+              <a:t>2/21/2020</a:t>
             </a:fld>
             <a:endParaRPr lang="en-US"/>
           </a:p>
@@ -2274,7 +2359,7 @@
           <a:p>
             <a:fld id="{331D76CF-5E7C-420B-89A3-7189BACB8345}" type="datetimeFigureOut">
               <a:rPr lang="en-US" smtClean="0"/>
-              <a:t>2/20/2020</a:t>
+              <a:t>2/21/2020</a:t>
             </a:fld>
             <a:endParaRPr lang="en-US"/>
           </a:p>
@@ -2551,7 +2636,7 @@
           <a:p>
             <a:fld id="{331D76CF-5E7C-420B-89A3-7189BACB8345}" type="datetimeFigureOut">
               <a:rPr lang="en-US" smtClean="0"/>
-              <a:t>2/20/2020</a:t>
+              <a:t>2/21/2020</a:t>
             </a:fld>
             <a:endParaRPr lang="en-US"/>
           </a:p>
@@ -2808,7 +2893,7 @@
           <a:p>
             <a:fld id="{331D76CF-5E7C-420B-89A3-7189BACB8345}" type="datetimeFigureOut">
               <a:rPr lang="en-US" smtClean="0"/>
-              <a:t>2/20/2020</a:t>
+              <a:t>2/21/2020</a:t>
             </a:fld>
             <a:endParaRPr lang="en-US"/>
           </a:p>
@@ -3021,7 +3106,7 @@
           <a:p>
             <a:fld id="{331D76CF-5E7C-420B-89A3-7189BACB8345}" type="datetimeFigureOut">
               <a:rPr lang="en-US" smtClean="0"/>
-              <a:t>2/20/2020</a:t>
+              <a:t>2/21/2020</a:t>
             </a:fld>
             <a:endParaRPr lang="en-US"/>
           </a:p>
@@ -3431,7 +3516,7 @@
           <p:cNvPr id="4" name="TextBox 3">
             <a:extLst>
               <a:ext uri="{FF2B5EF4-FFF2-40B4-BE49-F238E27FC236}">
-                <a16:creationId xmlns:a16="http://schemas.microsoft.com/office/drawing/2014/main" id="{8A67A37A-C488-40D7-A088-6774405888BB}"/>
+                <a16:creationId xmlns:a16="http://schemas.microsoft.com/office/drawing/2014/main" xmlns="" id="{8A67A37A-C488-40D7-A088-6774405888BB}"/>
               </a:ext>
             </a:extLst>
           </p:cNvPr>
@@ -3469,7 +3554,7 @@
           <p:cNvPr id="5" name="TextBox 4">
             <a:extLst>
               <a:ext uri="{FF2B5EF4-FFF2-40B4-BE49-F238E27FC236}">
-                <a16:creationId xmlns:a16="http://schemas.microsoft.com/office/drawing/2014/main" id="{EC931DCA-4690-4B93-9419-BA902293A61A}"/>
+                <a16:creationId xmlns:a16="http://schemas.microsoft.com/office/drawing/2014/main" xmlns="" id="{EC931DCA-4690-4B93-9419-BA902293A61A}"/>
               </a:ext>
             </a:extLst>
           </p:cNvPr>
@@ -3520,7 +3605,7 @@
           <p:cNvPr id="6" name="TextBox 5">
             <a:extLst>
               <a:ext uri="{FF2B5EF4-FFF2-40B4-BE49-F238E27FC236}">
-                <a16:creationId xmlns:a16="http://schemas.microsoft.com/office/drawing/2014/main" id="{69482C66-1608-4A0B-97A3-D6148119A6E2}"/>
+                <a16:creationId xmlns:a16="http://schemas.microsoft.com/office/drawing/2014/main" xmlns="" id="{69482C66-1608-4A0B-97A3-D6148119A6E2}"/>
               </a:ext>
             </a:extLst>
           </p:cNvPr>
@@ -3585,6 +3670,74 @@
     <p:extLst>
       <p:ext uri="{BB962C8B-B14F-4D97-AF65-F5344CB8AC3E}">
         <p14:creationId xmlns:p14="http://schemas.microsoft.com/office/powerpoint/2010/main" val="1594562380"/>
+      </p:ext>
+    </p:extLst>
+  </p:cSld>
+  <p:clrMapOvr>
+    <a:masterClrMapping/>
+  </p:clrMapOvr>
+</p:sld>
+</file>
+
+<file path=ppt/slides/slide10.xml><?xml version="1.0" encoding="utf-8"?>
+<p:sld xmlns:a="http://schemas.openxmlformats.org/drawingml/2006/main" xmlns:r="http://schemas.openxmlformats.org/officeDocument/2006/relationships" xmlns:p="http://schemas.openxmlformats.org/presentationml/2006/main">
+  <p:cSld>
+    <p:spTree>
+      <p:nvGrpSpPr>
+        <p:cNvPr id="1" name=""/>
+        <p:cNvGrpSpPr/>
+        <p:nvPr/>
+      </p:nvGrpSpPr>
+      <p:grpSpPr>
+        <a:xfrm>
+          <a:off x="0" y="0"/>
+          <a:ext cx="0" cy="0"/>
+          <a:chOff x="0" y="0"/>
+          <a:chExt cx="0" cy="0"/>
+        </a:xfrm>
+      </p:grpSpPr>
+      <p:sp>
+        <p:nvSpPr>
+          <p:cNvPr id="2" name="TextBox 1">
+            <a:extLst>
+              <a:ext uri="{FF2B5EF4-FFF2-40B4-BE49-F238E27FC236}">
+                <a16:creationId xmlns:a16="http://schemas.microsoft.com/office/drawing/2014/main" xmlns="" id="{3B09DE32-597E-4CC7-B78C-12D97E9A70A5}"/>
+              </a:ext>
+            </a:extLst>
+          </p:cNvPr>
+          <p:cNvSpPr txBox="1"/>
+          <p:nvPr/>
+        </p:nvSpPr>
+        <p:spPr>
+          <a:xfrm>
+            <a:off x="0" y="0"/>
+            <a:ext cx="8134066" cy="523220"/>
+          </a:xfrm>
+          <a:prstGeom prst="rect">
+            <a:avLst/>
+          </a:prstGeom>
+        </p:spPr>
+        <p:txBody>
+          <a:bodyPr rtlCol="0">
+            <a:spAutoFit/>
+          </a:bodyPr>
+          <a:lstStyle/>
+          <a:p>
+            <a:r>
+              <a:rPr lang="en-US" sz="2800" dirty="0">
+                <a:solidFill>
+                  <a:srgbClr val="002060"/>
+                </a:solidFill>
+              </a:rPr>
+              <a:t>Questions?</a:t>
+            </a:r>
+          </a:p>
+        </p:txBody>
+      </p:sp>
+    </p:spTree>
+    <p:extLst>
+      <p:ext uri="{BB962C8B-B14F-4D97-AF65-F5344CB8AC3E}">
+        <p14:creationId xmlns:p14="http://schemas.microsoft.com/office/powerpoint/2010/main" val="2363791476"/>
       </p:ext>
     </p:extLst>
   </p:cSld>
@@ -3616,7 +3769,7 @@
           <p:cNvPr id="4" name="TextBox 3">
             <a:extLst>
               <a:ext uri="{FF2B5EF4-FFF2-40B4-BE49-F238E27FC236}">
-                <a16:creationId xmlns:a16="http://schemas.microsoft.com/office/drawing/2014/main" id="{8A67A37A-C488-40D7-A088-6774405888BB}"/>
+                <a16:creationId xmlns:a16="http://schemas.microsoft.com/office/drawing/2014/main" xmlns="" id="{8A67A37A-C488-40D7-A088-6774405888BB}"/>
               </a:ext>
             </a:extLst>
           </p:cNvPr>
@@ -3654,7 +3807,7 @@
           <p:cNvPr id="10" name="TextBox 9">
             <a:extLst>
               <a:ext uri="{FF2B5EF4-FFF2-40B4-BE49-F238E27FC236}">
-                <a16:creationId xmlns:a16="http://schemas.microsoft.com/office/drawing/2014/main" id="{B794F186-6985-47E4-A49A-2AD80E84575A}"/>
+                <a16:creationId xmlns:a16="http://schemas.microsoft.com/office/drawing/2014/main" xmlns="" id="{B794F186-6985-47E4-A49A-2AD80E84575A}"/>
               </a:ext>
             </a:extLst>
           </p:cNvPr>
@@ -3719,7 +3872,7 @@
           <p:cNvPr id="5" name="Picture 4" descr="(Tim Hoffman) - Mozilla Firefox">
             <a:extLst>
               <a:ext uri="{FF2B5EF4-FFF2-40B4-BE49-F238E27FC236}">
-                <a16:creationId xmlns:a16="http://schemas.microsoft.com/office/drawing/2014/main" id="{C3B115B8-4522-47C6-A190-8E7A883BF389}"/>
+                <a16:creationId xmlns:a16="http://schemas.microsoft.com/office/drawing/2014/main" xmlns="" id="{C3B115B8-4522-47C6-A190-8E7A883BF389}"/>
               </a:ext>
             </a:extLst>
           </p:cNvPr>
@@ -3759,7 +3912,7 @@
           <p:cNvPr id="7" name="Straight Connector 6">
             <a:extLst>
               <a:ext uri="{FF2B5EF4-FFF2-40B4-BE49-F238E27FC236}">
-                <a16:creationId xmlns:a16="http://schemas.microsoft.com/office/drawing/2014/main" id="{98776B76-9EE3-4391-BCF1-7C0BFF14F050}"/>
+                <a16:creationId xmlns:a16="http://schemas.microsoft.com/office/drawing/2014/main" xmlns="" id="{98776B76-9EE3-4391-BCF1-7C0BFF14F050}"/>
               </a:ext>
             </a:extLst>
           </p:cNvPr>
@@ -3826,7 +3979,7 @@
           <p:cNvPr id="4" name="TextBox 3">
             <a:extLst>
               <a:ext uri="{FF2B5EF4-FFF2-40B4-BE49-F238E27FC236}">
-                <a16:creationId xmlns:a16="http://schemas.microsoft.com/office/drawing/2014/main" id="{A33DFDDC-493D-405D-B04C-41CC04E14DD5}"/>
+                <a16:creationId xmlns:a16="http://schemas.microsoft.com/office/drawing/2014/main" xmlns="" id="{A33DFDDC-493D-405D-B04C-41CC04E14DD5}"/>
               </a:ext>
             </a:extLst>
           </p:cNvPr>
@@ -3864,7 +4017,7 @@
           <p:cNvPr id="9" name="Picture 8" descr="C:\Users\Karin\Google Drive\CS\CS401MD\Lab5.java - Notepad++">
             <a:extLst>
               <a:ext uri="{FF2B5EF4-FFF2-40B4-BE49-F238E27FC236}">
-                <a16:creationId xmlns:a16="http://schemas.microsoft.com/office/drawing/2014/main" id="{FAC78682-8D19-4EF0-B4E4-059CB76C8F70}"/>
+                <a16:creationId xmlns:a16="http://schemas.microsoft.com/office/drawing/2014/main" xmlns="" id="{FAC78682-8D19-4EF0-B4E4-059CB76C8F70}"/>
               </a:ext>
             </a:extLst>
           </p:cNvPr>
@@ -3929,7 +4082,7 @@
           <p:cNvPr id="2" name="TextBox 1">
             <a:extLst>
               <a:ext uri="{FF2B5EF4-FFF2-40B4-BE49-F238E27FC236}">
-                <a16:creationId xmlns:a16="http://schemas.microsoft.com/office/drawing/2014/main" id="{B5C44F68-5F40-4D50-8517-AFD589F2C217}"/>
+                <a16:creationId xmlns:a16="http://schemas.microsoft.com/office/drawing/2014/main" xmlns="" id="{B5C44F68-5F40-4D50-8517-AFD589F2C217}"/>
               </a:ext>
             </a:extLst>
           </p:cNvPr>
@@ -3980,7 +4133,7 @@
           <p:cNvPr id="4" name="Picture 3" descr="C:\Users\Karin\Google Drive\CS\CS401MD\Lab5.java - Notepad++">
             <a:extLst>
               <a:ext uri="{FF2B5EF4-FFF2-40B4-BE49-F238E27FC236}">
-                <a16:creationId xmlns:a16="http://schemas.microsoft.com/office/drawing/2014/main" id="{26ECE76F-6194-403E-9BDA-004CE7F48CCE}"/>
+                <a16:creationId xmlns:a16="http://schemas.microsoft.com/office/drawing/2014/main" xmlns="" id="{26ECE76F-6194-403E-9BDA-004CE7F48CCE}"/>
               </a:ext>
             </a:extLst>
           </p:cNvPr>
@@ -4015,7 +4168,7 @@
           <p:cNvPr id="5" name="Picture 4" descr="C:\Users\Karin\Google Drive\CS\CS401MD\Lab5.java - Notepad++">
             <a:extLst>
               <a:ext uri="{FF2B5EF4-FFF2-40B4-BE49-F238E27FC236}">
-                <a16:creationId xmlns:a16="http://schemas.microsoft.com/office/drawing/2014/main" id="{A2DDC9BE-9CD1-435C-BA40-B6AA3462FFBF}"/>
+                <a16:creationId xmlns:a16="http://schemas.microsoft.com/office/drawing/2014/main" xmlns="" id="{A2DDC9BE-9CD1-435C-BA40-B6AA3462FFBF}"/>
               </a:ext>
             </a:extLst>
           </p:cNvPr>
@@ -4050,7 +4203,7 @@
           <p:cNvPr id="6" name="TextBox 5">
             <a:extLst>
               <a:ext uri="{FF2B5EF4-FFF2-40B4-BE49-F238E27FC236}">
-                <a16:creationId xmlns:a16="http://schemas.microsoft.com/office/drawing/2014/main" id="{4B3A2D23-3247-4378-A8F1-C6DC0E4B21F5}"/>
+                <a16:creationId xmlns:a16="http://schemas.microsoft.com/office/drawing/2014/main" xmlns="" id="{4B3A2D23-3247-4378-A8F1-C6DC0E4B21F5}"/>
               </a:ext>
             </a:extLst>
           </p:cNvPr>
@@ -4088,7 +4241,7 @@
           <p:cNvPr id="8" name="TextBox 7">
             <a:extLst>
               <a:ext uri="{FF2B5EF4-FFF2-40B4-BE49-F238E27FC236}">
-                <a16:creationId xmlns:a16="http://schemas.microsoft.com/office/drawing/2014/main" id="{F125EFAC-F5F3-482E-A475-09D24AD5E495}"/>
+                <a16:creationId xmlns:a16="http://schemas.microsoft.com/office/drawing/2014/main" xmlns="" id="{F125EFAC-F5F3-482E-A475-09D24AD5E495}"/>
               </a:ext>
             </a:extLst>
           </p:cNvPr>
@@ -4182,7 +4335,7 @@
           <p:cNvPr id="9" name="TextBox 8">
             <a:extLst>
               <a:ext uri="{FF2B5EF4-FFF2-40B4-BE49-F238E27FC236}">
-                <a16:creationId xmlns:a16="http://schemas.microsoft.com/office/drawing/2014/main" id="{9AA70C97-959D-400D-AC65-0BF60181EA23}"/>
+                <a16:creationId xmlns:a16="http://schemas.microsoft.com/office/drawing/2014/main" xmlns="" id="{9AA70C97-959D-400D-AC65-0BF60181EA23}"/>
               </a:ext>
             </a:extLst>
           </p:cNvPr>
@@ -4308,7 +4461,7 @@
           <p:cNvPr id="5" name="TextBox 4">
             <a:extLst>
               <a:ext uri="{FF2B5EF4-FFF2-40B4-BE49-F238E27FC236}">
-                <a16:creationId xmlns:a16="http://schemas.microsoft.com/office/drawing/2014/main" id="{9088C0C5-3912-4CF7-9396-2CC69694556A}"/>
+                <a16:creationId xmlns:a16="http://schemas.microsoft.com/office/drawing/2014/main" xmlns="" id="{9088C0C5-3912-4CF7-9396-2CC69694556A}"/>
               </a:ext>
             </a:extLst>
           </p:cNvPr>
@@ -4346,7 +4499,7 @@
           <p:cNvPr id="7" name="Picture 6" descr="C:\Users\Karin\Google Drive\CS\CS401MD\Lab5_orig.java - Notepad++">
             <a:extLst>
               <a:ext uri="{FF2B5EF4-FFF2-40B4-BE49-F238E27FC236}">
-                <a16:creationId xmlns:a16="http://schemas.microsoft.com/office/drawing/2014/main" id="{EDB349DD-A7D9-403D-A627-A34475B977E7}"/>
+                <a16:creationId xmlns:a16="http://schemas.microsoft.com/office/drawing/2014/main" xmlns="" id="{EDB349DD-A7D9-403D-A627-A34475B977E7}"/>
               </a:ext>
             </a:extLst>
           </p:cNvPr>
@@ -4381,7 +4534,7 @@
           <p:cNvPr id="9" name="Straight Connector 8">
             <a:extLst>
               <a:ext uri="{FF2B5EF4-FFF2-40B4-BE49-F238E27FC236}">
-                <a16:creationId xmlns:a16="http://schemas.microsoft.com/office/drawing/2014/main" id="{4538047D-BF73-4BCE-B6CE-154249B731B6}"/>
+                <a16:creationId xmlns:a16="http://schemas.microsoft.com/office/drawing/2014/main" xmlns="" id="{4538047D-BF73-4BCE-B6CE-154249B731B6}"/>
               </a:ext>
             </a:extLst>
           </p:cNvPr>
@@ -4418,7 +4571,7 @@
           <p:cNvPr id="11" name="TextBox 10">
             <a:extLst>
               <a:ext uri="{FF2B5EF4-FFF2-40B4-BE49-F238E27FC236}">
-                <a16:creationId xmlns:a16="http://schemas.microsoft.com/office/drawing/2014/main" id="{0EF16A9D-4CFB-4F7A-82A4-21C754470D84}"/>
+                <a16:creationId xmlns:a16="http://schemas.microsoft.com/office/drawing/2014/main" xmlns="" id="{0EF16A9D-4CFB-4F7A-82A4-21C754470D84}"/>
               </a:ext>
             </a:extLst>
           </p:cNvPr>
@@ -4503,7 +4656,7 @@
           <p:cNvPr id="5" name="TextBox 4">
             <a:extLst>
               <a:ext uri="{FF2B5EF4-FFF2-40B4-BE49-F238E27FC236}">
-                <a16:creationId xmlns:a16="http://schemas.microsoft.com/office/drawing/2014/main" id="{9088C0C5-3912-4CF7-9396-2CC69694556A}"/>
+                <a16:creationId xmlns:a16="http://schemas.microsoft.com/office/drawing/2014/main" xmlns="" id="{9088C0C5-3912-4CF7-9396-2CC69694556A}"/>
               </a:ext>
             </a:extLst>
           </p:cNvPr>
@@ -4541,7 +4694,7 @@
           <p:cNvPr id="11" name="TextBox 10">
             <a:extLst>
               <a:ext uri="{FF2B5EF4-FFF2-40B4-BE49-F238E27FC236}">
-                <a16:creationId xmlns:a16="http://schemas.microsoft.com/office/drawing/2014/main" id="{0EF16A9D-4CFB-4F7A-82A4-21C754470D84}"/>
+                <a16:creationId xmlns:a16="http://schemas.microsoft.com/office/drawing/2014/main" xmlns="" id="{0EF16A9D-4CFB-4F7A-82A4-21C754470D84}"/>
               </a:ext>
             </a:extLst>
           </p:cNvPr>
@@ -4610,7 +4763,7 @@
           <p:cNvPr id="3" name="Picture 2" descr="Elementary Sorts - Mozilla Firefox">
             <a:extLst>
               <a:ext uri="{FF2B5EF4-FFF2-40B4-BE49-F238E27FC236}">
-                <a16:creationId xmlns:a16="http://schemas.microsoft.com/office/drawing/2014/main" id="{AE3424F7-EF6A-47D5-9A73-318B18BBE747}"/>
+                <a16:creationId xmlns:a16="http://schemas.microsoft.com/office/drawing/2014/main" xmlns="" id="{AE3424F7-EF6A-47D5-9A73-318B18BBE747}"/>
               </a:ext>
             </a:extLst>
           </p:cNvPr>
@@ -4675,7 +4828,7 @@
           <p:cNvPr id="5" name="TextBox 4">
             <a:extLst>
               <a:ext uri="{FF2B5EF4-FFF2-40B4-BE49-F238E27FC236}">
-                <a16:creationId xmlns:a16="http://schemas.microsoft.com/office/drawing/2014/main" id="{9088C0C5-3912-4CF7-9396-2CC69694556A}"/>
+                <a16:creationId xmlns:a16="http://schemas.microsoft.com/office/drawing/2014/main" xmlns="" id="{9088C0C5-3912-4CF7-9396-2CC69694556A}"/>
               </a:ext>
             </a:extLst>
           </p:cNvPr>
@@ -4713,7 +4866,7 @@
           <p:cNvPr id="4" name="Picture 3" descr="C:\Users\Karin\Google Drive\CS\CS401MD\Lab5_orig.java - Notepad++">
             <a:extLst>
               <a:ext uri="{FF2B5EF4-FFF2-40B4-BE49-F238E27FC236}">
-                <a16:creationId xmlns:a16="http://schemas.microsoft.com/office/drawing/2014/main" id="{B8269434-322F-4C37-9481-7CFDC4143E60}"/>
+                <a16:creationId xmlns:a16="http://schemas.microsoft.com/office/drawing/2014/main" xmlns="" id="{B8269434-322F-4C37-9481-7CFDC4143E60}"/>
               </a:ext>
             </a:extLst>
           </p:cNvPr>
@@ -4748,7 +4901,7 @@
           <p:cNvPr id="6" name="TextBox 5">
             <a:extLst>
               <a:ext uri="{FF2B5EF4-FFF2-40B4-BE49-F238E27FC236}">
-                <a16:creationId xmlns:a16="http://schemas.microsoft.com/office/drawing/2014/main" id="{96E50AFB-9204-4462-B328-1D521495F7CB}"/>
+                <a16:creationId xmlns:a16="http://schemas.microsoft.com/office/drawing/2014/main" xmlns="" id="{96E50AFB-9204-4462-B328-1D521495F7CB}"/>
               </a:ext>
             </a:extLst>
           </p:cNvPr>
@@ -4773,8 +4926,13 @@
           <a:p>
             <a:r>
               <a:rPr lang="en-US" sz="2000" dirty="0"/>
-              <a:t>This will be demonstrated on the whiteboard (an image will be uploaded later).</a:t>
-            </a:r>
+              <a:t>This will be demonstrated on the whiteboard </a:t>
+            </a:r>
+            <a:r>
+              <a:rPr lang="en-US" sz="2000" dirty="0" smtClean="0"/>
+              <a:t>(see next slide)</a:t>
+            </a:r>
+            <a:endParaRPr lang="en-US" sz="2000" dirty="0"/>
           </a:p>
           <a:p>
             <a:endParaRPr lang="en-US" sz="2000" dirty="0"/>
@@ -4860,7 +5018,7 @@
           <p:cNvPr id="5" name="TextBox 4">
             <a:extLst>
               <a:ext uri="{FF2B5EF4-FFF2-40B4-BE49-F238E27FC236}">
-                <a16:creationId xmlns:a16="http://schemas.microsoft.com/office/drawing/2014/main" id="{9088C0C5-3912-4CF7-9396-2CC69694556A}"/>
+                <a16:creationId xmlns:a16="http://schemas.microsoft.com/office/drawing/2014/main" xmlns="" id="{9088C0C5-3912-4CF7-9396-2CC69694556A}"/>
               </a:ext>
             </a:extLst>
           </p:cNvPr>
@@ -4895,175 +5053,38 @@
       </p:sp>
       <p:pic>
         <p:nvPicPr>
-          <p:cNvPr id="4" name="Picture 3" descr="C:\Users\Karin\Google Drive\CS\CS401MD\Lab5_orig.java - Notepad++">
-            <a:extLst>
-              <a:ext uri="{FF2B5EF4-FFF2-40B4-BE49-F238E27FC236}">
-                <a16:creationId xmlns:a16="http://schemas.microsoft.com/office/drawing/2014/main" id="{B8269434-322F-4C37-9481-7CFDC4143E60}"/>
-              </a:ext>
-            </a:extLst>
-          </p:cNvPr>
+          <p:cNvPr id="2" name="Picture 1"/>
           <p:cNvPicPr>
             <a:picLocks noChangeAspect="1"/>
           </p:cNvPicPr>
           <p:nvPr/>
         </p:nvPicPr>
-        <p:blipFill rotWithShape="1">
-          <a:blip r:embed="rId2">
+        <p:blipFill>
+          <a:blip r:embed="rId3" cstate="print">
             <a:extLst>
               <a:ext uri="{28A0092B-C50C-407E-A947-70E740481C1C}">
                 <a14:useLocalDpi xmlns:a14="http://schemas.microsoft.com/office/drawing/2010/main" val="0"/>
               </a:ext>
             </a:extLst>
           </a:blip>
-          <a:srcRect l="6753" t="41579" r="32208" b="14920"/>
-          <a:stretch/>
+          <a:stretch>
+            <a:fillRect/>
+          </a:stretch>
         </p:blipFill>
         <p:spPr>
           <a:xfrm>
-            <a:off x="190006" y="523220"/>
-            <a:ext cx="5581402" cy="2683824"/>
+            <a:off x="249725" y="548639"/>
+            <a:ext cx="8225860" cy="6168460"/>
           </a:xfrm>
           <a:prstGeom prst="rect">
             <a:avLst/>
           </a:prstGeom>
         </p:spPr>
       </p:pic>
-      <p:sp>
-        <p:nvSpPr>
-          <p:cNvPr id="6" name="TextBox 5">
-            <a:extLst>
-              <a:ext uri="{FF2B5EF4-FFF2-40B4-BE49-F238E27FC236}">
-                <a16:creationId xmlns:a16="http://schemas.microsoft.com/office/drawing/2014/main" id="{96E50AFB-9204-4462-B328-1D521495F7CB}"/>
-              </a:ext>
-            </a:extLst>
-          </p:cNvPr>
-          <p:cNvSpPr txBox="1"/>
-          <p:nvPr/>
-        </p:nvSpPr>
-        <p:spPr>
-          <a:xfrm>
-            <a:off x="451261" y="3657600"/>
-            <a:ext cx="7980219" cy="3416320"/>
-          </a:xfrm>
-          <a:prstGeom prst="rect">
-            <a:avLst/>
-          </a:prstGeom>
-          <a:noFill/>
-        </p:spPr>
-        <p:txBody>
-          <a:bodyPr wrap="square" rtlCol="0">
-            <a:spAutoFit/>
-          </a:bodyPr>
-          <a:lstStyle/>
-          <a:p>
-            <a:r>
-              <a:rPr lang="en-US" u="sng" dirty="0"/>
-              <a:t>Java operations that are likely to be useful here</a:t>
-            </a:r>
-            <a:r>
-              <a:rPr lang="en-US" dirty="0"/>
-              <a:t>:</a:t>
-            </a:r>
-          </a:p>
-          <a:p>
-            <a:pPr marL="342900" indent="-342900">
-              <a:buFont typeface="+mj-lt"/>
-              <a:buAutoNum type="arabicPeriod"/>
-            </a:pPr>
-            <a:r>
-              <a:rPr lang="en-US" dirty="0"/>
-              <a:t>for loop nested inside another for loop</a:t>
-            </a:r>
-          </a:p>
-          <a:p>
-            <a:pPr marL="342900" indent="-342900">
-              <a:buFont typeface="+mj-lt"/>
-              <a:buAutoNum type="arabicPeriod"/>
-            </a:pPr>
-            <a:r>
-              <a:rPr lang="en-US" dirty="0"/>
-              <a:t>if statement conditioned on array[</a:t>
-            </a:r>
-            <a:r>
-              <a:rPr lang="en-US" dirty="0" err="1"/>
-              <a:t>i</a:t>
-            </a:r>
-            <a:r>
-              <a:rPr lang="en-US" dirty="0"/>
-              <a:t>] &gt; array[i+1]</a:t>
-            </a:r>
-          </a:p>
-          <a:p>
-            <a:pPr marL="342900" indent="-342900">
-              <a:buFont typeface="+mj-lt"/>
-              <a:buAutoNum type="arabicPeriod"/>
-            </a:pPr>
-            <a:r>
-              <a:rPr lang="en-US" dirty="0"/>
-              <a:t>Code that will handle the swapping of two values (if this is unfamiliar, see </a:t>
-            </a:r>
-            <a:r>
-              <a:rPr lang="en-US" dirty="0">
-                <a:hlinkClick r:id="rId3"/>
-              </a:rPr>
-              <a:t>https://en.wikipedia.org/wiki/Swap_(computer_programming)#Using_a_temporary_variable</a:t>
-            </a:r>
-            <a:r>
-              <a:rPr lang="en-US" dirty="0"/>
-              <a:t>)</a:t>
-            </a:r>
-          </a:p>
-          <a:p>
-            <a:pPr marL="800100" lvl="1" indent="-342900">
-              <a:buFont typeface="Arial" panose="020B0604020202020204" pitchFamily="34" charset="0"/>
-              <a:buChar char="•"/>
-            </a:pPr>
-            <a:r>
-              <a:rPr lang="en-US" dirty="0"/>
-              <a:t>This will also be useful for selection sort</a:t>
-            </a:r>
-          </a:p>
-          <a:p>
-            <a:pPr marL="342900" indent="-342900">
-              <a:buFont typeface="+mj-lt"/>
-              <a:buAutoNum type="arabicPeriod"/>
-            </a:pPr>
-            <a:r>
-              <a:rPr lang="en-US" dirty="0"/>
-              <a:t>Note that bubble sort (as well as selection sort) are “in place” sorting algorithms – you should not need to create a separate, 2</a:t>
-            </a:r>
-            <a:r>
-              <a:rPr lang="en-US" baseline="30000" dirty="0"/>
-              <a:t>nd</a:t>
-            </a:r>
-            <a:r>
-              <a:rPr lang="en-US" dirty="0"/>
-              <a:t> array – you can just swap items within the single array. </a:t>
-            </a:r>
-          </a:p>
-          <a:p>
-            <a:pPr marL="342900" indent="-342900">
-              <a:buFont typeface="+mj-lt"/>
-              <a:buAutoNum type="arabicPeriod"/>
-            </a:pPr>
-            <a:r>
-              <a:rPr lang="en-US" dirty="0"/>
-              <a:t>It’s a void method – no need to return anything.</a:t>
-            </a:r>
-          </a:p>
-          <a:p>
-            <a:pPr marL="342900" indent="-342900">
-              <a:buFont typeface="+mj-lt"/>
-              <a:buAutoNum type="arabicPeriod"/>
-            </a:pPr>
-            <a:endParaRPr lang="en-US" dirty="0"/>
-          </a:p>
-        </p:txBody>
-      </p:sp>
     </p:spTree>
     <p:extLst>
       <p:ext uri="{BB962C8B-B14F-4D97-AF65-F5344CB8AC3E}">
-        <p14:creationId xmlns:p14="http://schemas.microsoft.com/office/powerpoint/2010/main" val="3621411935"/>
+        <p14:creationId xmlns:p14="http://schemas.microsoft.com/office/powerpoint/2010/main" val="2756776955"/>
       </p:ext>
     </p:extLst>
   </p:cSld>
@@ -5092,10 +5113,10 @@
       </p:grpSpPr>
       <p:sp>
         <p:nvSpPr>
-          <p:cNvPr id="2" name="TextBox 1">
+          <p:cNvPr id="5" name="TextBox 4">
             <a:extLst>
               <a:ext uri="{FF2B5EF4-FFF2-40B4-BE49-F238E27FC236}">
-                <a16:creationId xmlns:a16="http://schemas.microsoft.com/office/drawing/2014/main" id="{3B09DE32-597E-4CC7-B78C-12D97E9A70A5}"/>
+                <a16:creationId xmlns:a16="http://schemas.microsoft.com/office/drawing/2014/main" xmlns="" id="{9088C0C5-3912-4CF7-9396-2CC69694556A}"/>
               </a:ext>
             </a:extLst>
           </p:cNvPr>
@@ -5123,15 +5144,182 @@
                   <a:srgbClr val="002060"/>
                 </a:solidFill>
               </a:rPr>
-              <a:t>Questions?</a:t>
-            </a:r>
+              <a:t>Lab #5: Bubble Sort  </a:t>
+            </a:r>
+          </a:p>
+        </p:txBody>
+      </p:sp>
+      <p:pic>
+        <p:nvPicPr>
+          <p:cNvPr id="4" name="Picture 3" descr="C:\Users\Karin\Google Drive\CS\CS401MD\Lab5_orig.java - Notepad++">
+            <a:extLst>
+              <a:ext uri="{FF2B5EF4-FFF2-40B4-BE49-F238E27FC236}">
+                <a16:creationId xmlns:a16="http://schemas.microsoft.com/office/drawing/2014/main" xmlns="" id="{B8269434-322F-4C37-9481-7CFDC4143E60}"/>
+              </a:ext>
+            </a:extLst>
+          </p:cNvPr>
+          <p:cNvPicPr>
+            <a:picLocks noChangeAspect="1"/>
+          </p:cNvPicPr>
+          <p:nvPr/>
+        </p:nvPicPr>
+        <p:blipFill rotWithShape="1">
+          <a:blip r:embed="rId2">
+            <a:extLst>
+              <a:ext uri="{28A0092B-C50C-407E-A947-70E740481C1C}">
+                <a14:useLocalDpi xmlns:a14="http://schemas.microsoft.com/office/drawing/2010/main" val="0"/>
+              </a:ext>
+            </a:extLst>
+          </a:blip>
+          <a:srcRect l="6753" t="41579" r="32208" b="14920"/>
+          <a:stretch/>
+        </p:blipFill>
+        <p:spPr>
+          <a:xfrm>
+            <a:off x="190006" y="523220"/>
+            <a:ext cx="5581402" cy="2683824"/>
+          </a:xfrm>
+          <a:prstGeom prst="rect">
+            <a:avLst/>
+          </a:prstGeom>
+        </p:spPr>
+      </p:pic>
+      <p:sp>
+        <p:nvSpPr>
+          <p:cNvPr id="6" name="TextBox 5">
+            <a:extLst>
+              <a:ext uri="{FF2B5EF4-FFF2-40B4-BE49-F238E27FC236}">
+                <a16:creationId xmlns:a16="http://schemas.microsoft.com/office/drawing/2014/main" xmlns="" id="{96E50AFB-9204-4462-B328-1D521495F7CB}"/>
+              </a:ext>
+            </a:extLst>
+          </p:cNvPr>
+          <p:cNvSpPr txBox="1"/>
+          <p:nvPr/>
+        </p:nvSpPr>
+        <p:spPr>
+          <a:xfrm>
+            <a:off x="451261" y="3657600"/>
+            <a:ext cx="7980219" cy="3416320"/>
+          </a:xfrm>
+          <a:prstGeom prst="rect">
+            <a:avLst/>
+          </a:prstGeom>
+          <a:noFill/>
+        </p:spPr>
+        <p:txBody>
+          <a:bodyPr wrap="square" rtlCol="0">
+            <a:spAutoFit/>
+          </a:bodyPr>
+          <a:lstStyle/>
+          <a:p>
+            <a:r>
+              <a:rPr lang="en-US" u="sng" dirty="0"/>
+              <a:t>Java operations that are likely to be useful here</a:t>
+            </a:r>
+            <a:r>
+              <a:rPr lang="en-US" dirty="0"/>
+              <a:t>:</a:t>
+            </a:r>
+          </a:p>
+          <a:p>
+            <a:pPr marL="342900" indent="-342900">
+              <a:buFont typeface="+mj-lt"/>
+              <a:buAutoNum type="arabicPeriod"/>
+            </a:pPr>
+            <a:r>
+              <a:rPr lang="en-US" dirty="0"/>
+              <a:t>for loop nested inside another for loop</a:t>
+            </a:r>
+          </a:p>
+          <a:p>
+            <a:pPr marL="342900" indent="-342900">
+              <a:buFont typeface="+mj-lt"/>
+              <a:buAutoNum type="arabicPeriod"/>
+            </a:pPr>
+            <a:r>
+              <a:rPr lang="en-US" dirty="0"/>
+              <a:t>if statement conditioned on array[</a:t>
+            </a:r>
+            <a:r>
+              <a:rPr lang="en-US" dirty="0" err="1"/>
+              <a:t>i</a:t>
+            </a:r>
+            <a:r>
+              <a:rPr lang="en-US" dirty="0"/>
+              <a:t>] &gt; array[i+1]</a:t>
+            </a:r>
+          </a:p>
+          <a:p>
+            <a:pPr marL="342900" indent="-342900">
+              <a:buFont typeface="+mj-lt"/>
+              <a:buAutoNum type="arabicPeriod"/>
+            </a:pPr>
+            <a:r>
+              <a:rPr lang="en-US" dirty="0"/>
+              <a:t>Code that will handle the swapping of two values (if this is unfamiliar, see </a:t>
+            </a:r>
+            <a:r>
+              <a:rPr lang="en-US" dirty="0">
+                <a:hlinkClick r:id="rId3"/>
+              </a:rPr>
+              <a:t>https://en.wikipedia.org/wiki/Swap_(computer_programming)#Using_a_temporary_variable</a:t>
+            </a:r>
+            <a:r>
+              <a:rPr lang="en-US" dirty="0"/>
+              <a:t>)</a:t>
+            </a:r>
+          </a:p>
+          <a:p>
+            <a:pPr marL="800100" lvl="1" indent="-342900">
+              <a:buFont typeface="Arial" panose="020B0604020202020204" pitchFamily="34" charset="0"/>
+              <a:buChar char="•"/>
+            </a:pPr>
+            <a:r>
+              <a:rPr lang="en-US" dirty="0"/>
+              <a:t>This will also be useful for selection sort</a:t>
+            </a:r>
+          </a:p>
+          <a:p>
+            <a:pPr marL="342900" indent="-342900">
+              <a:buFont typeface="+mj-lt"/>
+              <a:buAutoNum type="arabicPeriod"/>
+            </a:pPr>
+            <a:r>
+              <a:rPr lang="en-US" dirty="0"/>
+              <a:t>Note that bubble sort (as well as selection sort) are “in place” sorting algorithms – you should not need to create a separate, 2</a:t>
+            </a:r>
+            <a:r>
+              <a:rPr lang="en-US" baseline="30000" dirty="0"/>
+              <a:t>nd</a:t>
+            </a:r>
+            <a:r>
+              <a:rPr lang="en-US" dirty="0"/>
+              <a:t> array – you can just swap items within the single array. </a:t>
+            </a:r>
+          </a:p>
+          <a:p>
+            <a:pPr marL="342900" indent="-342900">
+              <a:buFont typeface="+mj-lt"/>
+              <a:buAutoNum type="arabicPeriod"/>
+            </a:pPr>
+            <a:r>
+              <a:rPr lang="en-US" dirty="0"/>
+              <a:t>It’s a void method – no need to return anything.</a:t>
+            </a:r>
+          </a:p>
+          <a:p>
+            <a:pPr marL="342900" indent="-342900">
+              <a:buFont typeface="+mj-lt"/>
+              <a:buAutoNum type="arabicPeriod"/>
+            </a:pPr>
+            <a:endParaRPr lang="en-US" dirty="0"/>
           </a:p>
         </p:txBody>
       </p:sp>
     </p:spTree>
     <p:extLst>
       <p:ext uri="{BB962C8B-B14F-4D97-AF65-F5344CB8AC3E}">
-        <p14:creationId xmlns:p14="http://schemas.microsoft.com/office/powerpoint/2010/main" val="2363791476"/>
+        <p14:creationId xmlns:p14="http://schemas.microsoft.com/office/powerpoint/2010/main" val="3621411935"/>
       </p:ext>
     </p:extLst>
   </p:cSld>

</xml_diff>